<commit_message>
feat: added some changes
</commit_message>
<xml_diff>
--- a/Presentation_Final.pptx
+++ b/Presentation_Final.pptx
@@ -5,7 +5,7 @@
     <p:sldMasterId id="2147483648" r:id="rId1"/>
   </p:sldMasterIdLst>
   <p:notesMasterIdLst>
-    <p:notesMasterId r:id="rId20"/>
+    <p:notesMasterId r:id="rId18"/>
   </p:notesMasterIdLst>
   <p:sldIdLst>
     <p:sldId id="265" r:id="rId2"/>
@@ -22,10 +22,8 @@
     <p:sldId id="256" r:id="rId13"/>
     <p:sldId id="259" r:id="rId14"/>
     <p:sldId id="274" r:id="rId15"/>
-    <p:sldId id="284" r:id="rId16"/>
-    <p:sldId id="285" r:id="rId17"/>
-    <p:sldId id="269" r:id="rId18"/>
-    <p:sldId id="267" r:id="rId19"/>
+    <p:sldId id="269" r:id="rId16"/>
+    <p:sldId id="267" r:id="rId17"/>
   </p:sldIdLst>
   <p:sldSz cx="12192000" cy="6858000"/>
   <p:notesSz cx="6858000" cy="9144000"/>
@@ -225,7 +223,7 @@
           <a:p>
             <a:fld id="{3FB86D26-4AA4-4F90-BB95-258DF1FF82AB}" type="datetimeFigureOut">
               <a:rPr lang="en-US"/>
-              <a:t>9/23/2023</a:t>
+              <a:t>9/24/2023</a:t>
             </a:fld>
             <a:endParaRPr lang="en-US"/>
           </a:p>
@@ -591,6 +589,90 @@
 </p:notes>
 </file>
 
+<file path=ppt/notesSlides/notesSlide2.xml><?xml version="1.0" encoding="utf-8"?>
+<p:notes xmlns:a="http://schemas.openxmlformats.org/drawingml/2006/main" xmlns:r="http://schemas.openxmlformats.org/officeDocument/2006/relationships" xmlns:p="http://schemas.openxmlformats.org/presentationml/2006/main">
+  <p:cSld>
+    <p:spTree>
+      <p:nvGrpSpPr>
+        <p:cNvPr id="1" name=""/>
+        <p:cNvGrpSpPr/>
+        <p:nvPr/>
+      </p:nvGrpSpPr>
+      <p:grpSpPr>
+        <a:xfrm>
+          <a:off x="0" y="0"/>
+          <a:ext cx="0" cy="0"/>
+          <a:chOff x="0" y="0"/>
+          <a:chExt cx="0" cy="0"/>
+        </a:xfrm>
+      </p:grpSpPr>
+      <p:sp>
+        <p:nvSpPr>
+          <p:cNvPr id="2" name="Slide Image Placeholder 1"/>
+          <p:cNvSpPr>
+            <a:spLocks noGrp="1" noRot="1" noChangeAspect="1"/>
+          </p:cNvSpPr>
+          <p:nvPr>
+            <p:ph type="sldImg"/>
+          </p:nvPr>
+        </p:nvSpPr>
+        <p:spPr/>
+      </p:sp>
+      <p:sp>
+        <p:nvSpPr>
+          <p:cNvPr id="3" name="Notes Placeholder 2"/>
+          <p:cNvSpPr>
+            <a:spLocks noGrp="1"/>
+          </p:cNvSpPr>
+          <p:nvPr>
+            <p:ph type="body" idx="1"/>
+          </p:nvPr>
+        </p:nvSpPr>
+        <p:spPr/>
+        <p:txBody>
+          <a:bodyPr/>
+          <a:lstStyle/>
+          <a:p>
+            <a:endParaRPr lang="en-IN" dirty="0"/>
+          </a:p>
+        </p:txBody>
+      </p:sp>
+      <p:sp>
+        <p:nvSpPr>
+          <p:cNvPr id="4" name="Slide Number Placeholder 3"/>
+          <p:cNvSpPr>
+            <a:spLocks noGrp="1"/>
+          </p:cNvSpPr>
+          <p:nvPr>
+            <p:ph type="sldNum" sz="quarter" idx="5"/>
+          </p:nvPr>
+        </p:nvSpPr>
+        <p:spPr/>
+        <p:txBody>
+          <a:bodyPr/>
+          <a:lstStyle/>
+          <a:p>
+            <a:fld id="{64CA5F2E-292F-4AE8-B3B1-3D3E00C0E853}" type="slidenum">
+              <a:rPr lang="en-US" smtClean="0"/>
+              <a:t>5</a:t>
+            </a:fld>
+            <a:endParaRPr lang="en-US"/>
+          </a:p>
+        </p:txBody>
+      </p:sp>
+    </p:spTree>
+    <p:extLst>
+      <p:ext uri="{BB962C8B-B14F-4D97-AF65-F5344CB8AC3E}">
+        <p14:creationId xmlns:p14="http://schemas.microsoft.com/office/powerpoint/2010/main" val="3273150035"/>
+      </p:ext>
+    </p:extLst>
+  </p:cSld>
+  <p:clrMapOvr>
+    <a:masterClrMapping/>
+  </p:clrMapOvr>
+</p:notes>
+</file>
+
 <file path=ppt/slideLayouts/slideLayout1.xml><?xml version="1.0" encoding="utf-8"?>
 <p:sldLayout xmlns:a="http://schemas.openxmlformats.org/drawingml/2006/main" xmlns:r="http://schemas.openxmlformats.org/officeDocument/2006/relationships" xmlns:p="http://schemas.openxmlformats.org/presentationml/2006/main" showMasterSp="0" type="title" preserve="1">
   <p:cSld name="Title Slide">
@@ -815,7 +897,7 @@
           <a:p>
             <a:fld id="{96DFF08F-DC6B-4601-B491-B0F83F6DD2DA}" type="datetimeFigureOut">
               <a:rPr lang="en-US" dirty="0"/>
-              <a:t>9/23/2023</a:t>
+              <a:t>9/24/2023</a:t>
             </a:fld>
             <a:endParaRPr lang="en-US"/>
           </a:p>
@@ -1016,7 +1098,7 @@
           <a:p>
             <a:fld id="{96DFF08F-DC6B-4601-B491-B0F83F6DD2DA}" type="datetimeFigureOut">
               <a:rPr lang="en-US" dirty="0"/>
-              <a:t>9/23/2023</a:t>
+              <a:t>9/24/2023</a:t>
             </a:fld>
             <a:endParaRPr lang="en-US"/>
           </a:p>
@@ -1265,7 +1347,7 @@
           <a:p>
             <a:fld id="{96DFF08F-DC6B-4601-B491-B0F83F6DD2DA}" type="datetimeFigureOut">
               <a:rPr lang="en-US" dirty="0"/>
-              <a:t>9/23/2023</a:t>
+              <a:t>9/24/2023</a:t>
             </a:fld>
             <a:endParaRPr lang="en-US"/>
           </a:p>
@@ -1428,7 +1510,7 @@
           <a:p>
             <a:fld id="{D62CEF3B-A037-46D0-B02C-1428F07E9383}" type="datetimeFigureOut">
               <a:rPr lang="en-US" dirty="0"/>
-              <a:t>9/23/2023</a:t>
+              <a:t>9/24/2023</a:t>
             </a:fld>
             <a:endParaRPr lang="en-US"/>
           </a:p>
@@ -1765,7 +1847,7 @@
           <a:p>
             <a:fld id="{96DFF08F-DC6B-4601-B491-B0F83F6DD2DA}" type="datetimeFigureOut">
               <a:rPr lang="en-US" dirty="0"/>
-              <a:t>9/23/2023</a:t>
+              <a:t>9/24/2023</a:t>
             </a:fld>
             <a:endParaRPr lang="en-US"/>
           </a:p>
@@ -2032,7 +2114,7 @@
           <a:p>
             <a:fld id="{96DFF08F-DC6B-4601-B491-B0F83F6DD2DA}" type="datetimeFigureOut">
               <a:rPr lang="en-US" dirty="0"/>
-              <a:t>9/23/2023</a:t>
+              <a:t>9/24/2023</a:t>
             </a:fld>
             <a:endParaRPr lang="en-US"/>
           </a:p>
@@ -2403,7 +2485,7 @@
           <a:p>
             <a:fld id="{96DFF08F-DC6B-4601-B491-B0F83F6DD2DA}" type="datetimeFigureOut">
               <a:rPr lang="en-US" dirty="0"/>
-              <a:t>9/23/2023</a:t>
+              <a:t>9/24/2023</a:t>
             </a:fld>
             <a:endParaRPr lang="en-US"/>
           </a:p>
@@ -2515,7 +2597,7 @@
           <a:p>
             <a:fld id="{96DFF08F-DC6B-4601-B491-B0F83F6DD2DA}" type="datetimeFigureOut">
               <a:rPr lang="en-US" dirty="0"/>
-              <a:t>9/23/2023</a:t>
+              <a:t>9/24/2023</a:t>
             </a:fld>
             <a:endParaRPr lang="en-US"/>
           </a:p>
@@ -2681,7 +2763,7 @@
           <a:p>
             <a:fld id="{96DFF08F-DC6B-4601-B491-B0F83F6DD2DA}" type="datetimeFigureOut">
               <a:rPr lang="en-US" dirty="0"/>
-              <a:t>9/23/2023</a:t>
+              <a:t>9/24/2023</a:t>
             </a:fld>
             <a:endParaRPr lang="en-US"/>
           </a:p>
@@ -3028,7 +3110,7 @@
           <a:p>
             <a:fld id="{96DFF08F-DC6B-4601-B491-B0F83F6DD2DA}" type="datetimeFigureOut">
               <a:rPr lang="en-US" dirty="0"/>
-              <a:t>9/23/2023</a:t>
+              <a:t>9/24/2023</a:t>
             </a:fld>
             <a:endParaRPr lang="en-US"/>
           </a:p>
@@ -3395,7 +3477,7 @@
           <a:p>
             <a:fld id="{96DFF08F-DC6B-4601-B491-B0F83F6DD2DA}" type="datetimeFigureOut">
               <a:rPr lang="en-US" dirty="0"/>
-              <a:t>9/23/2023</a:t>
+              <a:t>9/24/2023</a:t>
             </a:fld>
             <a:endParaRPr lang="en-US"/>
           </a:p>
@@ -3675,7 +3757,7 @@
           <a:p>
             <a:fld id="{96DFF08F-DC6B-4601-B491-B0F83F6DD2DA}" type="datetimeFigureOut">
               <a:rPr lang="en-US" dirty="0"/>
-              <a:t>9/23/2023</a:t>
+              <a:t>9/24/2023</a:t>
             </a:fld>
             <a:endParaRPr lang="en-US"/>
           </a:p>
@@ -5444,20 +5526,44 @@
       </p:grpSpPr>
       <p:sp>
         <p:nvSpPr>
+          <p:cNvPr id="2" name="Title 1"/>
+          <p:cNvSpPr>
+            <a:spLocks noGrp="1"/>
+          </p:cNvSpPr>
+          <p:nvPr>
+            <p:ph type="title"/>
+          </p:nvPr>
+        </p:nvSpPr>
+        <p:spPr>
+          <a:xfrm>
+            <a:off x="838200" y="784778"/>
+            <a:ext cx="10515600" cy="715530"/>
+          </a:xfrm>
+        </p:spPr>
+        <p:txBody>
+          <a:bodyPr>
+            <a:normAutofit/>
+          </a:bodyPr>
+          <a:lstStyle/>
+          <a:p>
+            <a:r>
+              <a:rPr lang="en-US"/>
+              <a:t>Conclusion:</a:t>
+            </a:r>
+          </a:p>
+        </p:txBody>
+      </p:sp>
+      <p:sp>
+        <p:nvSpPr>
           <p:cNvPr id="3" name="Content Placeholder 2"/>
           <p:cNvSpPr>
             <a:spLocks noGrp="1"/>
           </p:cNvSpPr>
           <p:nvPr>
-            <p:ph sz="half" idx="4294967295"/>
-          </p:nvPr>
-        </p:nvSpPr>
-        <p:spPr>
-          <a:xfrm>
-            <a:off x="0" y="1845945"/>
-            <a:ext cx="4937760" cy="4023360"/>
-          </a:xfrm>
-        </p:spPr>
+            <p:ph idx="1"/>
+          </p:nvPr>
+        </p:nvSpPr>
+        <p:spPr/>
         <p:txBody>
           <a:bodyPr vert="horz" lIns="0" tIns="45720" rIns="0" bIns="45720" rtlCol="0" anchor="t">
             <a:normAutofit/>
@@ -5477,414 +5583,16 @@
           </a:p>
         </p:txBody>
       </p:sp>
-      <p:pic>
-        <p:nvPicPr>
-          <p:cNvPr id="4" name="Content Placeholder 3" descr="Virtual-work-exp-Image"/>
-          <p:cNvPicPr>
-            <a:picLocks noGrp="1" noChangeAspect="1"/>
-          </p:cNvPicPr>
-          <p:nvPr>
-            <p:ph sz="half" idx="4294967295"/>
-          </p:nvPr>
-        </p:nvPicPr>
-        <p:blipFill>
-          <a:blip r:embed="rId3"/>
-          <a:stretch>
-            <a:fillRect/>
-          </a:stretch>
-        </p:blipFill>
-        <p:spPr>
-          <a:xfrm>
-            <a:off x="3975735" y="2002155"/>
-            <a:ext cx="4239895" cy="2272030"/>
-          </a:xfrm>
-          <a:prstGeom prst="rect">
-            <a:avLst/>
-          </a:prstGeom>
-        </p:spPr>
-      </p:pic>
-      <p:sp>
-        <p:nvSpPr>
-          <p:cNvPr id="7" name="Rounded Rectangle 6"/>
-          <p:cNvSpPr/>
-          <p:nvPr/>
-        </p:nvSpPr>
-        <p:spPr>
-          <a:xfrm>
-            <a:off x="1003300" y="1056005"/>
-            <a:ext cx="2388870" cy="1287145"/>
-          </a:xfrm>
-          <a:prstGeom prst="roundRect">
-            <a:avLst/>
-          </a:prstGeom>
-        </p:spPr>
-        <p:style>
-          <a:lnRef idx="2">
-            <a:schemeClr val="accent1">
-              <a:shade val="50000"/>
-            </a:schemeClr>
-          </a:lnRef>
-          <a:fillRef idx="1">
-            <a:schemeClr val="accent1"/>
-          </a:fillRef>
-          <a:effectRef idx="0">
-            <a:schemeClr val="accent1"/>
-          </a:effectRef>
-          <a:fontRef idx="minor">
-            <a:schemeClr val="lt1"/>
-          </a:fontRef>
-        </p:style>
-        <p:txBody>
-          <a:bodyPr rtlCol="0" anchor="ctr"/>
-          <a:lstStyle/>
-          <a:p>
-            <a:pPr algn="ctr"/>
-            <a:endParaRPr lang="en-US"/>
-          </a:p>
-        </p:txBody>
-      </p:sp>
-      <p:sp>
-        <p:nvSpPr>
-          <p:cNvPr id="11" name="Rounded Rectangle 10"/>
-          <p:cNvSpPr/>
-          <p:nvPr/>
-        </p:nvSpPr>
-        <p:spPr>
-          <a:xfrm>
-            <a:off x="805815" y="4274185"/>
-            <a:ext cx="2388870" cy="1287145"/>
-          </a:xfrm>
-          <a:prstGeom prst="roundRect">
-            <a:avLst/>
-          </a:prstGeom>
-        </p:spPr>
-        <p:style>
-          <a:lnRef idx="2">
-            <a:schemeClr val="accent1">
-              <a:shade val="50000"/>
-            </a:schemeClr>
-          </a:lnRef>
-          <a:fillRef idx="1">
-            <a:schemeClr val="accent1"/>
-          </a:fillRef>
-          <a:effectRef idx="0">
-            <a:schemeClr val="accent1"/>
-          </a:effectRef>
-          <a:fontRef idx="minor">
-            <a:schemeClr val="lt1"/>
-          </a:fontRef>
-        </p:style>
-        <p:txBody>
-          <a:bodyPr rtlCol="0" anchor="ctr"/>
-          <a:lstStyle/>
-          <a:p>
-            <a:pPr algn="ctr"/>
-            <a:endParaRPr lang="en-US"/>
-          </a:p>
-        </p:txBody>
-      </p:sp>
-      <p:sp>
-        <p:nvSpPr>
-          <p:cNvPr id="12" name="Rounded Rectangle 11"/>
-          <p:cNvSpPr/>
-          <p:nvPr/>
-        </p:nvSpPr>
-        <p:spPr>
-          <a:xfrm>
-            <a:off x="9140825" y="1845945"/>
-            <a:ext cx="2388870" cy="1348740"/>
-          </a:xfrm>
-          <a:prstGeom prst="roundRect">
-            <a:avLst/>
-          </a:prstGeom>
-        </p:spPr>
-        <p:style>
-          <a:lnRef idx="2">
-            <a:schemeClr val="accent1">
-              <a:shade val="50000"/>
-            </a:schemeClr>
-          </a:lnRef>
-          <a:fillRef idx="1">
-            <a:schemeClr val="accent1"/>
-          </a:fillRef>
-          <a:effectRef idx="0">
-            <a:schemeClr val="accent1"/>
-          </a:effectRef>
-          <a:fontRef idx="minor">
-            <a:schemeClr val="lt1"/>
-          </a:fontRef>
-        </p:style>
-        <p:txBody>
-          <a:bodyPr rtlCol="0" anchor="ctr"/>
-          <a:lstStyle/>
-          <a:p>
-            <a:pPr algn="ctr"/>
-            <a:endParaRPr lang="en-US"/>
-          </a:p>
-        </p:txBody>
-      </p:sp>
-      <p:sp>
-        <p:nvSpPr>
-          <p:cNvPr id="13" name="Rounded Rectangle 12"/>
-          <p:cNvSpPr/>
-          <p:nvPr/>
-        </p:nvSpPr>
-        <p:spPr>
-          <a:xfrm>
-            <a:off x="8787130" y="4646295"/>
-            <a:ext cx="2388870" cy="1287145"/>
-          </a:xfrm>
-          <a:prstGeom prst="roundRect">
-            <a:avLst/>
-          </a:prstGeom>
-        </p:spPr>
-        <p:style>
-          <a:lnRef idx="2">
-            <a:schemeClr val="accent1">
-              <a:shade val="50000"/>
-            </a:schemeClr>
-          </a:lnRef>
-          <a:fillRef idx="1">
-            <a:schemeClr val="accent1"/>
-          </a:fillRef>
-          <a:effectRef idx="0">
-            <a:schemeClr val="accent1"/>
-          </a:effectRef>
-          <a:fontRef idx="minor">
-            <a:schemeClr val="lt1"/>
-          </a:fontRef>
-        </p:style>
-        <p:txBody>
-          <a:bodyPr rtlCol="0" anchor="ctr"/>
-          <a:lstStyle/>
-          <a:p>
-            <a:pPr algn="ctr"/>
-            <a:endParaRPr lang="en-US"/>
-          </a:p>
-        </p:txBody>
-      </p:sp>
-      <p:sp>
-        <p:nvSpPr>
-          <p:cNvPr id="14" name="Rounded Rectangle 13"/>
-          <p:cNvSpPr/>
-          <p:nvPr/>
-        </p:nvSpPr>
-        <p:spPr>
-          <a:xfrm>
-            <a:off x="4900930" y="4878705"/>
-            <a:ext cx="2388870" cy="1287145"/>
-          </a:xfrm>
-          <a:prstGeom prst="roundRect">
-            <a:avLst/>
-          </a:prstGeom>
-        </p:spPr>
-        <p:style>
-          <a:lnRef idx="2">
-            <a:schemeClr val="accent1">
-              <a:shade val="50000"/>
-            </a:schemeClr>
-          </a:lnRef>
-          <a:fillRef idx="1">
-            <a:schemeClr val="accent1"/>
-          </a:fillRef>
-          <a:effectRef idx="0">
-            <a:schemeClr val="accent1"/>
-          </a:effectRef>
-          <a:fontRef idx="minor">
-            <a:schemeClr val="lt1"/>
-          </a:fontRef>
-        </p:style>
-        <p:txBody>
-          <a:bodyPr rtlCol="0" anchor="ctr"/>
-          <a:lstStyle/>
-          <a:p>
-            <a:pPr algn="ctr"/>
-            <a:endParaRPr lang="en-US"/>
-          </a:p>
-        </p:txBody>
-      </p:sp>
-      <p:cxnSp>
-        <p:nvCxnSpPr>
-          <p:cNvPr id="15" name="Straight Arrow Connector 14"/>
-          <p:cNvCxnSpPr>
-            <a:stCxn id="7" idx="3"/>
-          </p:cNvCxnSpPr>
-          <p:nvPr/>
-        </p:nvCxnSpPr>
-        <p:spPr>
-          <a:xfrm>
-            <a:off x="3392170" y="1699895"/>
-            <a:ext cx="585470" cy="760095"/>
-          </a:xfrm>
-          <a:prstGeom prst="straightConnector1">
-            <a:avLst/>
-          </a:prstGeom>
-          <a:ln>
-            <a:tailEnd type="arrow" w="med" len="med"/>
-          </a:ln>
-        </p:spPr>
-        <p:style>
-          <a:lnRef idx="1">
-            <a:schemeClr val="dk1"/>
-          </a:lnRef>
-          <a:fillRef idx="0">
-            <a:schemeClr val="dk1"/>
-          </a:fillRef>
-          <a:effectRef idx="0">
-            <a:schemeClr val="dk1"/>
-          </a:effectRef>
-          <a:fontRef idx="minor">
-            <a:schemeClr val="tx1"/>
-          </a:fontRef>
-        </p:style>
-      </p:cxnSp>
-      <p:cxnSp>
-        <p:nvCxnSpPr>
-          <p:cNvPr id="16" name="Straight Arrow Connector 15"/>
-          <p:cNvCxnSpPr/>
-          <p:nvPr/>
-        </p:nvCxnSpPr>
-        <p:spPr>
-          <a:xfrm flipH="1">
-            <a:off x="8189595" y="3048635"/>
-            <a:ext cx="951230" cy="279400"/>
-          </a:xfrm>
-          <a:prstGeom prst="straightConnector1">
-            <a:avLst/>
-          </a:prstGeom>
-          <a:ln>
-            <a:tailEnd type="arrow" w="med" len="med"/>
-          </a:ln>
-        </p:spPr>
-        <p:style>
-          <a:lnRef idx="1">
-            <a:schemeClr val="dk1"/>
-          </a:lnRef>
-          <a:fillRef idx="0">
-            <a:schemeClr val="dk1"/>
-          </a:fillRef>
-          <a:effectRef idx="0">
-            <a:schemeClr val="dk1"/>
-          </a:effectRef>
-          <a:fontRef idx="minor">
-            <a:schemeClr val="tx1"/>
-          </a:fontRef>
-        </p:style>
-      </p:cxnSp>
-      <p:cxnSp>
-        <p:nvCxnSpPr>
-          <p:cNvPr id="17" name="Straight Arrow Connector 16"/>
-          <p:cNvCxnSpPr/>
-          <p:nvPr/>
-        </p:nvCxnSpPr>
-        <p:spPr>
-          <a:xfrm flipH="1" flipV="1">
-            <a:off x="8204835" y="4103370"/>
-            <a:ext cx="1116965" cy="542925"/>
-          </a:xfrm>
-          <a:prstGeom prst="straightConnector1">
-            <a:avLst/>
-          </a:prstGeom>
-          <a:ln>
-            <a:tailEnd type="arrow" w="med" len="med"/>
-          </a:ln>
-        </p:spPr>
-        <p:style>
-          <a:lnRef idx="1">
-            <a:schemeClr val="dk1"/>
-          </a:lnRef>
-          <a:fillRef idx="0">
-            <a:schemeClr val="dk1"/>
-          </a:fillRef>
-          <a:effectRef idx="0">
-            <a:schemeClr val="dk1"/>
-          </a:effectRef>
-          <a:fontRef idx="minor">
-            <a:schemeClr val="tx1"/>
-          </a:fontRef>
-        </p:style>
-      </p:cxnSp>
-      <p:cxnSp>
-        <p:nvCxnSpPr>
-          <p:cNvPr id="18" name="Straight Arrow Connector 17"/>
-          <p:cNvCxnSpPr>
-            <a:stCxn id="11" idx="0"/>
-          </p:cNvCxnSpPr>
-          <p:nvPr/>
-        </p:nvCxnSpPr>
-        <p:spPr>
-          <a:xfrm flipV="1">
-            <a:off x="2000250" y="3653155"/>
-            <a:ext cx="1938655" cy="621030"/>
-          </a:xfrm>
-          <a:prstGeom prst="straightConnector1">
-            <a:avLst/>
-          </a:prstGeom>
-          <a:ln>
-            <a:tailEnd type="arrow" w="med" len="med"/>
-          </a:ln>
-        </p:spPr>
-        <p:style>
-          <a:lnRef idx="1">
-            <a:schemeClr val="dk1"/>
-          </a:lnRef>
-          <a:fillRef idx="0">
-            <a:schemeClr val="dk1"/>
-          </a:fillRef>
-          <a:effectRef idx="0">
-            <a:schemeClr val="dk1"/>
-          </a:effectRef>
-          <a:fontRef idx="minor">
-            <a:schemeClr val="tx1"/>
-          </a:fontRef>
-        </p:style>
-      </p:cxnSp>
-      <p:cxnSp>
-        <p:nvCxnSpPr>
-          <p:cNvPr id="19" name="Straight Arrow Connector 18"/>
-          <p:cNvCxnSpPr>
-            <a:stCxn id="14" idx="0"/>
-            <a:endCxn id="4" idx="2"/>
-          </p:cNvCxnSpPr>
-          <p:nvPr/>
-        </p:nvCxnSpPr>
-        <p:spPr>
-          <a:xfrm flipV="1">
-            <a:off x="6095365" y="4274185"/>
-            <a:ext cx="635" cy="604520"/>
-          </a:xfrm>
-          <a:prstGeom prst="straightConnector1">
-            <a:avLst/>
-          </a:prstGeom>
-          <a:ln>
-            <a:tailEnd type="arrow" w="med" len="med"/>
-          </a:ln>
-        </p:spPr>
-        <p:style>
-          <a:lnRef idx="1">
-            <a:schemeClr val="dk1"/>
-          </a:lnRef>
-          <a:fillRef idx="0">
-            <a:schemeClr val="dk1"/>
-          </a:fillRef>
-          <a:effectRef idx="0">
-            <a:schemeClr val="dk1"/>
-          </a:effectRef>
-          <a:fontRef idx="minor">
-            <a:schemeClr val="tx1"/>
-          </a:fontRef>
-        </p:style>
-      </p:cxnSp>
-      <p:sp>
-        <p:nvSpPr>
-          <p:cNvPr id="20" name="Text Box 19"/>
+      <p:sp>
+        <p:nvSpPr>
+          <p:cNvPr id="5" name="TextBox 4"/>
           <p:cNvSpPr txBox="1"/>
           <p:nvPr/>
         </p:nvSpPr>
         <p:spPr>
           <a:xfrm>
-            <a:off x="805180" y="4274185"/>
-            <a:ext cx="2389505" cy="1014730"/>
+            <a:off x="1097280" y="1778000"/>
+            <a:ext cx="9926320" cy="1323439"/>
           </a:xfrm>
           <a:prstGeom prst="rect">
             <a:avLst/>
@@ -5892,238 +5600,20 @@
           <a:noFill/>
         </p:spPr>
         <p:txBody>
-          <a:bodyPr wrap="square" rtlCol="0">
+          <a:bodyPr rot="0" spcFirstLastPara="0" vertOverflow="overflow" horzOverflow="overflow" vert="horz" wrap="square" lIns="91440" tIns="45720" rIns="91440" bIns="45720" numCol="1" spcCol="0" rtlCol="0" fromWordArt="0" anchor="t" anchorCtr="0" forceAA="0" compatLnSpc="1">
             <a:spAutoFit/>
           </a:bodyPr>
           <a:lstStyle/>
           <a:p>
-            <a:r>
-              <a:rPr lang="en-US" sz="1200">
-                <a:latin typeface="Times New Roman" panose="02020603050405020304" charset="0"/>
-                <a:cs typeface="Times New Roman" panose="02020603050405020304" charset="0"/>
-                <a:sym typeface="+mn-ea"/>
-              </a:rPr>
-              <a:t>Sindhu Barathi A</a:t>
-            </a:r>
-            <a:endParaRPr lang="en-US" sz="1200">
-              <a:latin typeface="Times New Roman" panose="02020603050405020304" charset="0"/>
-              <a:cs typeface="Times New Roman" panose="02020603050405020304" charset="0"/>
-            </a:endParaRPr>
-          </a:p>
-          <a:p>
-            <a:pPr algn="just"/>
-            <a:r>
-              <a:rPr lang="en-US" sz="1200">
-                <a:latin typeface="Times New Roman" panose="02020603050405020304" charset="0"/>
-                <a:cs typeface="Times New Roman" panose="02020603050405020304" charset="0"/>
-                <a:sym typeface="+mn-ea"/>
-              </a:rPr>
-              <a:t>I learned so many new technologies which would be very helpful to build my  future.And it was a pleasure working as team</a:t>
-            </a:r>
-            <a:endParaRPr lang="en-US" sz="1200"/>
-          </a:p>
-        </p:txBody>
-      </p:sp>
-      <p:sp>
-        <p:nvSpPr>
-          <p:cNvPr id="21" name="Text Box 20"/>
-          <p:cNvSpPr txBox="1"/>
-          <p:nvPr/>
-        </p:nvSpPr>
-        <p:spPr>
-          <a:xfrm>
-            <a:off x="4937125" y="4878070"/>
-            <a:ext cx="2352040" cy="1045210"/>
-          </a:xfrm>
-          <a:prstGeom prst="rect">
-            <a:avLst/>
-          </a:prstGeom>
-          <a:noFill/>
-        </p:spPr>
-        <p:txBody>
-          <a:bodyPr wrap="square" rtlCol="0">
-            <a:spAutoFit/>
-          </a:bodyPr>
-          <a:lstStyle/>
-          <a:p>
-            <a:pPr algn="just"/>
-            <a:r>
-              <a:rPr lang="en-US" sz="1200">
-                <a:latin typeface="Times New Roman" panose="02020603050405020304" charset="0"/>
-                <a:cs typeface="Times New Roman" panose="02020603050405020304" charset="0"/>
-                <a:sym typeface="+mn-ea"/>
-              </a:rPr>
-              <a:t>Tamilarasi.K</a:t>
-            </a:r>
-            <a:endParaRPr lang="en-US" sz="1200">
-              <a:latin typeface="Times New Roman" panose="02020603050405020304" charset="0"/>
-              <a:cs typeface="Times New Roman" panose="02020603050405020304" charset="0"/>
-            </a:endParaRPr>
-          </a:p>
-          <a:p>
-            <a:pPr algn="just"/>
-            <a:r>
-              <a:rPr lang="en-US" sz="1200">
-                <a:latin typeface="Times New Roman" panose="02020603050405020304" charset="0"/>
-                <a:cs typeface="Times New Roman" panose="02020603050405020304" charset="0"/>
-                <a:sym typeface="+mn-ea"/>
-              </a:rPr>
-              <a:t>I learned how to work as a team and its was fun and learned lots of new things.</a:t>
-            </a:r>
-            <a:endParaRPr lang="en-US" sz="1400">
-              <a:latin typeface="Times New Roman" panose="02020603050405020304" charset="0"/>
-              <a:cs typeface="Times New Roman" panose="02020603050405020304" charset="0"/>
-            </a:endParaRPr>
-          </a:p>
-          <a:p>
-            <a:endParaRPr lang="en-US" sz="1400"/>
-          </a:p>
-        </p:txBody>
-      </p:sp>
-      <p:sp>
-        <p:nvSpPr>
-          <p:cNvPr id="22" name="Text Box 21"/>
-          <p:cNvSpPr txBox="1"/>
-          <p:nvPr/>
-        </p:nvSpPr>
-        <p:spPr>
-          <a:xfrm>
-            <a:off x="4606290" y="568960"/>
-            <a:ext cx="3919220" cy="645160"/>
-          </a:xfrm>
-          <a:prstGeom prst="rect">
-            <a:avLst/>
-          </a:prstGeom>
-          <a:noFill/>
-        </p:spPr>
-        <p:txBody>
-          <a:bodyPr wrap="square" rtlCol="0">
-            <a:spAutoFit/>
-          </a:bodyPr>
-          <a:lstStyle/>
-          <a:p>
-            <a:r>
-              <a:rPr lang="en-US" b="1">
-                <a:latin typeface="Times New Roman" panose="02020603050405020304" charset="0"/>
-                <a:cs typeface="Times New Roman" panose="02020603050405020304" charset="0"/>
-                <a:sym typeface="+mn-ea"/>
-              </a:rPr>
-              <a:t>OUR WORK EXPERIENCE</a:t>
-            </a:r>
-            <a:endParaRPr lang="en-US" b="1">
-              <a:latin typeface="Times New Roman" panose="02020603050405020304" charset="0"/>
-              <a:cs typeface="Times New Roman" panose="02020603050405020304" charset="0"/>
-            </a:endParaRPr>
-          </a:p>
-          <a:p>
+            <a:pPr marL="342900" indent="-342900">
+              <a:buFont typeface="Arial" panose="020B0604020202020204"/>
+              <a:buChar char="•"/>
+            </a:pPr>
+            <a:r>
+              <a:rPr lang="en-US" sz="2000"/>
+              <a:t>VoizFonica is a company that is aware of the new challenges posed by today’s society. This is why the company offer the means to facilitate communication between people, providing them with the most secure and state of the art technology in order for them to live better, and for them to achieve whatever they resolve.</a:t>
+            </a:r>
             <a:endParaRPr lang="en-US"/>
-          </a:p>
-        </p:txBody>
-      </p:sp>
-      <p:sp>
-        <p:nvSpPr>
-          <p:cNvPr id="23" name="Text Box 22"/>
-          <p:cNvSpPr txBox="1"/>
-          <p:nvPr/>
-        </p:nvSpPr>
-        <p:spPr>
-          <a:xfrm>
-            <a:off x="8787765" y="4646930"/>
-            <a:ext cx="2224405" cy="1383665"/>
-          </a:xfrm>
-          <a:prstGeom prst="rect">
-            <a:avLst/>
-          </a:prstGeom>
-          <a:noFill/>
-        </p:spPr>
-        <p:txBody>
-          <a:bodyPr wrap="square" rtlCol="0">
-            <a:spAutoFit/>
-          </a:bodyPr>
-          <a:lstStyle/>
-          <a:p>
-            <a:pPr algn="just"/>
-            <a:r>
-              <a:rPr lang="en-US" sz="1200">
-                <a:latin typeface="Times New Roman" panose="02020603050405020304" charset="0"/>
-                <a:cs typeface="Times New Roman" panose="02020603050405020304" charset="0"/>
-                <a:sym typeface="+mn-ea"/>
-              </a:rPr>
-              <a:t>Kanchana Goudar</a:t>
-            </a:r>
-            <a:endParaRPr lang="en-US" sz="1200">
-              <a:latin typeface="Times New Roman" panose="02020603050405020304" charset="0"/>
-              <a:cs typeface="Times New Roman" panose="02020603050405020304" charset="0"/>
-            </a:endParaRPr>
-          </a:p>
-          <a:p>
-            <a:pPr algn="just"/>
-            <a:r>
-              <a:rPr lang="en-US" sz="1200">
-                <a:latin typeface="Times New Roman" panose="02020603050405020304" charset="0"/>
-                <a:cs typeface="Times New Roman" panose="02020603050405020304" charset="0"/>
-                <a:sym typeface="+mn-ea"/>
-              </a:rPr>
-              <a:t>I worked with a good team. Learned so many new things and experienced that the  team work gives good results</a:t>
-            </a:r>
-            <a:r>
-              <a:rPr lang="en-US">
-                <a:latin typeface="Times New Roman" panose="02020603050405020304" charset="0"/>
-                <a:cs typeface="Times New Roman" panose="02020603050405020304" charset="0"/>
-                <a:sym typeface="+mn-ea"/>
-              </a:rPr>
-              <a:t> </a:t>
-            </a:r>
-            <a:endParaRPr lang="en-US">
-              <a:latin typeface="Times New Roman" panose="02020603050405020304" charset="0"/>
-              <a:cs typeface="Times New Roman" panose="02020603050405020304" charset="0"/>
-            </a:endParaRPr>
-          </a:p>
-          <a:p>
-            <a:endParaRPr lang="en-US"/>
-          </a:p>
-        </p:txBody>
-      </p:sp>
-      <p:sp>
-        <p:nvSpPr>
-          <p:cNvPr id="24" name="Text Box 23"/>
-          <p:cNvSpPr txBox="1"/>
-          <p:nvPr/>
-        </p:nvSpPr>
-        <p:spPr>
-          <a:xfrm>
-            <a:off x="9140190" y="1845310"/>
-            <a:ext cx="2389505" cy="1383665"/>
-          </a:xfrm>
-          <a:prstGeom prst="rect">
-            <a:avLst/>
-          </a:prstGeom>
-          <a:noFill/>
-        </p:spPr>
-        <p:txBody>
-          <a:bodyPr wrap="square" rtlCol="0">
-            <a:spAutoFit/>
-          </a:bodyPr>
-          <a:lstStyle/>
-          <a:p>
-            <a:pPr algn="just"/>
-            <a:r>
-              <a:rPr lang="en-US" sz="1200">
-                <a:latin typeface="Times New Roman" panose="02020603050405020304" charset="0"/>
-                <a:cs typeface="Times New Roman" panose="02020603050405020304" charset="0"/>
-              </a:rPr>
-              <a:t>Rakesh R</a:t>
-            </a:r>
-          </a:p>
-          <a:p>
-            <a:pPr algn="just"/>
-            <a:r>
-              <a:rPr lang="en-US" sz="1200">
-                <a:latin typeface="Times New Roman" panose="02020603050405020304" charset="0"/>
-                <a:cs typeface="Times New Roman" panose="02020603050405020304" charset="0"/>
-              </a:rPr>
-              <a:t>It was good experience to work in a group . Got to know that anything can be done with a good team work and ofcourse I have learnt many new things by working on this project.</a:t>
-            </a:r>
           </a:p>
         </p:txBody>
       </p:sp>
@@ -6136,702 +5626,6 @@
 </file>
 
 <file path=ppt/slides/slide16.xml><?xml version="1.0" encoding="utf-8"?>
-<p:sld xmlns:a="http://schemas.openxmlformats.org/drawingml/2006/main" xmlns:r="http://schemas.openxmlformats.org/officeDocument/2006/relationships" xmlns:p="http://schemas.openxmlformats.org/presentationml/2006/main">
-  <p:cSld>
-    <p:bg>
-      <p:bgPr>
-        <a:blipFill>
-          <a:blip r:embed="rId2" cstate="print"/>
-          <a:stretch>
-            <a:fillRect t="-17000" b="-17000"/>
-          </a:stretch>
-        </a:blipFill>
-        <a:effectLst/>
-      </p:bgPr>
-    </p:bg>
-    <p:spTree>
-      <p:nvGrpSpPr>
-        <p:cNvPr id="1" name=""/>
-        <p:cNvGrpSpPr/>
-        <p:nvPr/>
-      </p:nvGrpSpPr>
-      <p:grpSpPr>
-        <a:xfrm>
-          <a:off x="0" y="0"/>
-          <a:ext cx="0" cy="0"/>
-          <a:chOff x="0" y="0"/>
-          <a:chExt cx="0" cy="0"/>
-        </a:xfrm>
-      </p:grpSpPr>
-      <p:sp>
-        <p:nvSpPr>
-          <p:cNvPr id="3" name="Content Placeholder 2"/>
-          <p:cNvSpPr>
-            <a:spLocks noGrp="1"/>
-          </p:cNvSpPr>
-          <p:nvPr>
-            <p:ph sz="half" idx="4294967295"/>
-          </p:nvPr>
-        </p:nvSpPr>
-        <p:spPr>
-          <a:xfrm>
-            <a:off x="0" y="1845945"/>
-            <a:ext cx="4937760" cy="4023360"/>
-          </a:xfrm>
-        </p:spPr>
-        <p:txBody>
-          <a:bodyPr vert="horz" lIns="0" tIns="45720" rIns="0" bIns="45720" rtlCol="0" anchor="t">
-            <a:normAutofit/>
-          </a:bodyPr>
-          <a:lstStyle/>
-          <a:p>
-            <a:pPr>
-              <a:buFont typeface="Arial" panose="020B0604020202020204" pitchFamily="34" charset="0"/>
-              <a:buChar char="•"/>
-            </a:pPr>
-            <a:endParaRPr lang="en-US">
-              <a:cs typeface="Calibri" panose="020F0502020204030204"/>
-            </a:endParaRPr>
-          </a:p>
-          <a:p>
-            <a:endParaRPr lang="en-US"/>
-          </a:p>
-        </p:txBody>
-      </p:sp>
-      <p:pic>
-        <p:nvPicPr>
-          <p:cNvPr id="2" name="Picture 1" descr="ggg"/>
-          <p:cNvPicPr>
-            <a:picLocks noChangeAspect="1"/>
-          </p:cNvPicPr>
-          <p:nvPr/>
-        </p:nvPicPr>
-        <p:blipFill>
-          <a:blip r:embed="rId3"/>
-          <a:stretch>
-            <a:fillRect/>
-          </a:stretch>
-        </p:blipFill>
-        <p:spPr>
-          <a:xfrm>
-            <a:off x="1049655" y="996315"/>
-            <a:ext cx="9175750" cy="5348605"/>
-          </a:xfrm>
-          <a:prstGeom prst="rect">
-            <a:avLst/>
-          </a:prstGeom>
-        </p:spPr>
-      </p:pic>
-      <p:sp>
-        <p:nvSpPr>
-          <p:cNvPr id="10" name="Rounded Rectangle 9"/>
-          <p:cNvSpPr/>
-          <p:nvPr/>
-        </p:nvSpPr>
-        <p:spPr>
-          <a:xfrm>
-            <a:off x="3526790" y="4509770"/>
-            <a:ext cx="2552065" cy="1131570"/>
-          </a:xfrm>
-          <a:prstGeom prst="roundRect">
-            <a:avLst/>
-          </a:prstGeom>
-        </p:spPr>
-        <p:style>
-          <a:lnRef idx="2">
-            <a:schemeClr val="accent1">
-              <a:shade val="50000"/>
-            </a:schemeClr>
-          </a:lnRef>
-          <a:fillRef idx="1">
-            <a:schemeClr val="accent1"/>
-          </a:fillRef>
-          <a:effectRef idx="0">
-            <a:schemeClr val="accent1"/>
-          </a:effectRef>
-          <a:fontRef idx="minor">
-            <a:schemeClr val="lt1"/>
-          </a:fontRef>
-        </p:style>
-        <p:txBody>
-          <a:bodyPr rtlCol="0" anchor="ctr"/>
-          <a:lstStyle/>
-          <a:p>
-            <a:pPr algn="ctr"/>
-            <a:endParaRPr lang="en-US"/>
-          </a:p>
-        </p:txBody>
-      </p:sp>
-      <p:sp>
-        <p:nvSpPr>
-          <p:cNvPr id="16" name="Text Box 15"/>
-          <p:cNvSpPr txBox="1"/>
-          <p:nvPr/>
-        </p:nvSpPr>
-        <p:spPr>
-          <a:xfrm>
-            <a:off x="650240" y="535940"/>
-            <a:ext cx="4062095" cy="460375"/>
-          </a:xfrm>
-          <a:prstGeom prst="rect">
-            <a:avLst/>
-          </a:prstGeom>
-          <a:noFill/>
-        </p:spPr>
-        <p:txBody>
-          <a:bodyPr wrap="square" rtlCol="0">
-            <a:spAutoFit/>
-          </a:bodyPr>
-          <a:lstStyle/>
-          <a:p>
-            <a:r>
-              <a:rPr lang="en-US" sz="2400" b="1">
-                <a:latin typeface="Times New Roman" panose="02020603050405020304" charset="0"/>
-                <a:cs typeface="Times New Roman" panose="02020603050405020304" charset="0"/>
-              </a:rPr>
-              <a:t>OUR WORK EXPERIENCE</a:t>
-            </a:r>
-          </a:p>
-        </p:txBody>
-      </p:sp>
-      <p:sp>
-        <p:nvSpPr>
-          <p:cNvPr id="17" name="Rounded Rectangle 16"/>
-          <p:cNvSpPr/>
-          <p:nvPr/>
-        </p:nvSpPr>
-        <p:spPr>
-          <a:xfrm>
-            <a:off x="2354580" y="1497965"/>
-            <a:ext cx="2218055" cy="1132205"/>
-          </a:xfrm>
-          <a:prstGeom prst="roundRect">
-            <a:avLst/>
-          </a:prstGeom>
-        </p:spPr>
-        <p:style>
-          <a:lnRef idx="2">
-            <a:schemeClr val="accent1">
-              <a:shade val="50000"/>
-            </a:schemeClr>
-          </a:lnRef>
-          <a:fillRef idx="1">
-            <a:schemeClr val="accent1"/>
-          </a:fillRef>
-          <a:effectRef idx="0">
-            <a:schemeClr val="accent1"/>
-          </a:effectRef>
-          <a:fontRef idx="minor">
-            <a:schemeClr val="lt1"/>
-          </a:fontRef>
-        </p:style>
-        <p:txBody>
-          <a:bodyPr rtlCol="0" anchor="ctr"/>
-          <a:lstStyle/>
-          <a:p>
-            <a:pPr algn="ctr"/>
-            <a:endParaRPr lang="en-US"/>
-          </a:p>
-        </p:txBody>
-      </p:sp>
-      <p:sp>
-        <p:nvSpPr>
-          <p:cNvPr id="18" name="Rounded Rectangle 17"/>
-          <p:cNvSpPr/>
-          <p:nvPr/>
-        </p:nvSpPr>
-        <p:spPr>
-          <a:xfrm>
-            <a:off x="4937760" y="1498600"/>
-            <a:ext cx="2455545" cy="1131570"/>
-          </a:xfrm>
-          <a:prstGeom prst="roundRect">
-            <a:avLst/>
-          </a:prstGeom>
-        </p:spPr>
-        <p:style>
-          <a:lnRef idx="2">
-            <a:schemeClr val="accent1">
-              <a:shade val="50000"/>
-            </a:schemeClr>
-          </a:lnRef>
-          <a:fillRef idx="1">
-            <a:schemeClr val="accent1"/>
-          </a:fillRef>
-          <a:effectRef idx="0">
-            <a:schemeClr val="accent1"/>
-          </a:effectRef>
-          <a:fontRef idx="minor">
-            <a:schemeClr val="lt1"/>
-          </a:fontRef>
-        </p:style>
-        <p:txBody>
-          <a:bodyPr rtlCol="0" anchor="ctr"/>
-          <a:lstStyle/>
-          <a:p>
-            <a:pPr algn="ctr"/>
-            <a:endParaRPr lang="en-US"/>
-          </a:p>
-        </p:txBody>
-      </p:sp>
-      <p:sp>
-        <p:nvSpPr>
-          <p:cNvPr id="19" name="Rounded Rectangle 18"/>
-          <p:cNvSpPr/>
-          <p:nvPr/>
-        </p:nvSpPr>
-        <p:spPr>
-          <a:xfrm>
-            <a:off x="1049655" y="4509770"/>
-            <a:ext cx="2218055" cy="1132205"/>
-          </a:xfrm>
-          <a:prstGeom prst="roundRect">
-            <a:avLst/>
-          </a:prstGeom>
-        </p:spPr>
-        <p:style>
-          <a:lnRef idx="2">
-            <a:schemeClr val="accent1">
-              <a:shade val="50000"/>
-            </a:schemeClr>
-          </a:lnRef>
-          <a:fillRef idx="1">
-            <a:schemeClr val="accent1"/>
-          </a:fillRef>
-          <a:effectRef idx="0">
-            <a:schemeClr val="accent1"/>
-          </a:effectRef>
-          <a:fontRef idx="minor">
-            <a:schemeClr val="lt1"/>
-          </a:fontRef>
-        </p:style>
-        <p:txBody>
-          <a:bodyPr rtlCol="0" anchor="ctr"/>
-          <a:lstStyle/>
-          <a:p>
-            <a:pPr algn="ctr"/>
-            <a:endParaRPr lang="en-US"/>
-          </a:p>
-        </p:txBody>
-      </p:sp>
-      <p:sp>
-        <p:nvSpPr>
-          <p:cNvPr id="20" name="Rounded Rectangle 19"/>
-          <p:cNvSpPr/>
-          <p:nvPr/>
-        </p:nvSpPr>
-        <p:spPr>
-          <a:xfrm>
-            <a:off x="6563360" y="4510405"/>
-            <a:ext cx="2218055" cy="1132205"/>
-          </a:xfrm>
-          <a:prstGeom prst="roundRect">
-            <a:avLst/>
-          </a:prstGeom>
-        </p:spPr>
-        <p:style>
-          <a:lnRef idx="2">
-            <a:schemeClr val="accent1">
-              <a:shade val="50000"/>
-            </a:schemeClr>
-          </a:lnRef>
-          <a:fillRef idx="1">
-            <a:schemeClr val="accent1"/>
-          </a:fillRef>
-          <a:effectRef idx="0">
-            <a:schemeClr val="accent1"/>
-          </a:effectRef>
-          <a:fontRef idx="minor">
-            <a:schemeClr val="lt1"/>
-          </a:fontRef>
-        </p:style>
-        <p:txBody>
-          <a:bodyPr rtlCol="0" anchor="ctr"/>
-          <a:lstStyle/>
-          <a:p>
-            <a:pPr algn="just"/>
-            <a:endParaRPr lang="en-US" sz="1200">
-              <a:solidFill>
-                <a:schemeClr val="tx1"/>
-              </a:solidFill>
-              <a:latin typeface="Times New Roman" panose="02020603050405020304" charset="0"/>
-              <a:cs typeface="Times New Roman" panose="02020603050405020304" charset="0"/>
-              <a:sym typeface="+mn-ea"/>
-            </a:endParaRPr>
-          </a:p>
-        </p:txBody>
-      </p:sp>
-      <p:sp>
-        <p:nvSpPr>
-          <p:cNvPr id="22" name="Text Box 21"/>
-          <p:cNvSpPr txBox="1"/>
-          <p:nvPr/>
-        </p:nvSpPr>
-        <p:spPr>
-          <a:xfrm>
-            <a:off x="3526790" y="4485640"/>
-            <a:ext cx="2552065" cy="1014730"/>
-          </a:xfrm>
-          <a:prstGeom prst="rect">
-            <a:avLst/>
-          </a:prstGeom>
-          <a:noFill/>
-        </p:spPr>
-        <p:txBody>
-          <a:bodyPr wrap="square" rtlCol="0">
-            <a:spAutoFit/>
-          </a:bodyPr>
-          <a:lstStyle/>
-          <a:p>
-            <a:pPr algn="just"/>
-            <a:r>
-              <a:rPr lang="en-US" sz="1200">
-                <a:latin typeface="Times New Roman" panose="02020603050405020304" charset="0"/>
-                <a:cs typeface="Times New Roman" panose="02020603050405020304" charset="0"/>
-              </a:rPr>
-              <a:t>Sindhu Barathi A</a:t>
-            </a:r>
-          </a:p>
-          <a:p>
-            <a:pPr algn="just"/>
-            <a:r>
-              <a:rPr lang="en-US" sz="1200">
-                <a:latin typeface="Times New Roman" panose="02020603050405020304" charset="0"/>
-                <a:cs typeface="Times New Roman" panose="02020603050405020304" charset="0"/>
-              </a:rPr>
-              <a:t>I learned so many new technologies which would be very helpful to build my future.And it was a pleasure working as team.</a:t>
-            </a:r>
-          </a:p>
-        </p:txBody>
-      </p:sp>
-      <p:sp>
-        <p:nvSpPr>
-          <p:cNvPr id="23" name="Text Box 22"/>
-          <p:cNvSpPr txBox="1"/>
-          <p:nvPr/>
-        </p:nvSpPr>
-        <p:spPr>
-          <a:xfrm>
-            <a:off x="6562725" y="4510405"/>
-            <a:ext cx="2218055" cy="1014730"/>
-          </a:xfrm>
-          <a:prstGeom prst="rect">
-            <a:avLst/>
-          </a:prstGeom>
-          <a:noFill/>
-        </p:spPr>
-        <p:txBody>
-          <a:bodyPr wrap="square" rtlCol="0">
-            <a:spAutoFit/>
-          </a:bodyPr>
-          <a:lstStyle/>
-          <a:p>
-            <a:pPr algn="just"/>
-            <a:r>
-              <a:rPr lang="en-US" sz="1200">
-                <a:latin typeface="Times New Roman" panose="02020603050405020304" charset="0"/>
-                <a:cs typeface="Times New Roman" panose="02020603050405020304" charset="0"/>
-              </a:rPr>
-              <a:t>Tamilarasi.K</a:t>
-            </a:r>
-          </a:p>
-          <a:p>
-            <a:pPr algn="just"/>
-            <a:r>
-              <a:rPr lang="en-US" sz="1200">
-                <a:latin typeface="Times New Roman" panose="02020603050405020304" charset="0"/>
-                <a:cs typeface="Times New Roman" panose="02020603050405020304" charset="0"/>
-              </a:rPr>
-              <a:t>I learned how to work as a team and its was fun and learned lots of new things.</a:t>
-            </a:r>
-          </a:p>
-          <a:p>
-            <a:pPr algn="just"/>
-            <a:endParaRPr lang="en-US" sz="1200">
-              <a:latin typeface="Times New Roman" panose="02020603050405020304" charset="0"/>
-              <a:cs typeface="Times New Roman" panose="02020603050405020304" charset="0"/>
-            </a:endParaRPr>
-          </a:p>
-        </p:txBody>
-      </p:sp>
-      <p:sp>
-        <p:nvSpPr>
-          <p:cNvPr id="24" name="Text Box 23"/>
-          <p:cNvSpPr txBox="1"/>
-          <p:nvPr/>
-        </p:nvSpPr>
-        <p:spPr>
-          <a:xfrm>
-            <a:off x="1049020" y="4510405"/>
-            <a:ext cx="2082800" cy="1014730"/>
-          </a:xfrm>
-          <a:prstGeom prst="rect">
-            <a:avLst/>
-          </a:prstGeom>
-          <a:noFill/>
-        </p:spPr>
-        <p:txBody>
-          <a:bodyPr wrap="square" rtlCol="0">
-            <a:spAutoFit/>
-          </a:bodyPr>
-          <a:lstStyle/>
-          <a:p>
-            <a:pPr algn="just"/>
-            <a:r>
-              <a:rPr lang="en-US" sz="1200">
-                <a:latin typeface="Times New Roman" panose="02020603050405020304" charset="0"/>
-                <a:cs typeface="Times New Roman" panose="02020603050405020304" charset="0"/>
-              </a:rPr>
-              <a:t>Kanchana Goudar</a:t>
-            </a:r>
-          </a:p>
-          <a:p>
-            <a:pPr algn="just"/>
-            <a:r>
-              <a:rPr lang="en-US" sz="1200">
-                <a:latin typeface="Times New Roman" panose="02020603050405020304" charset="0"/>
-                <a:cs typeface="Times New Roman" panose="02020603050405020304" charset="0"/>
-              </a:rPr>
-              <a:t>I worked with a good team. Learned so many new things and experienced that the  team work gives good results </a:t>
-            </a:r>
-          </a:p>
-        </p:txBody>
-      </p:sp>
-      <p:sp>
-        <p:nvSpPr>
-          <p:cNvPr id="25" name="Text Box 24"/>
-          <p:cNvSpPr txBox="1"/>
-          <p:nvPr/>
-        </p:nvSpPr>
-        <p:spPr>
-          <a:xfrm>
-            <a:off x="4937125" y="1498600"/>
-            <a:ext cx="2456180" cy="1383665"/>
-          </a:xfrm>
-          <a:prstGeom prst="rect">
-            <a:avLst/>
-          </a:prstGeom>
-          <a:noFill/>
-        </p:spPr>
-        <p:txBody>
-          <a:bodyPr wrap="square" rtlCol="0">
-            <a:spAutoFit/>
-          </a:bodyPr>
-          <a:lstStyle/>
-          <a:p>
-            <a:pPr algn="just"/>
-            <a:r>
-              <a:rPr lang="en-US" sz="1200">
-                <a:latin typeface="Times New Roman" panose="02020603050405020304" charset="0"/>
-                <a:cs typeface="Times New Roman" panose="02020603050405020304" charset="0"/>
-                <a:sym typeface="+mn-ea"/>
-              </a:rPr>
-              <a:t>Rakesh R</a:t>
-            </a:r>
-            <a:endParaRPr lang="en-US" sz="1200">
-              <a:latin typeface="Times New Roman" panose="02020603050405020304" charset="0"/>
-              <a:cs typeface="Times New Roman" panose="02020603050405020304" charset="0"/>
-            </a:endParaRPr>
-          </a:p>
-          <a:p>
-            <a:pPr algn="just"/>
-            <a:r>
-              <a:rPr lang="en-US" sz="1200">
-                <a:latin typeface="Times New Roman" panose="02020603050405020304" charset="0"/>
-                <a:cs typeface="Times New Roman" panose="02020603050405020304" charset="0"/>
-                <a:sym typeface="+mn-ea"/>
-              </a:rPr>
-              <a:t>It was good experience to work in a group . Got to know that anything can be done with a good team work and ofcourse I have learnt many new things by working on this project.</a:t>
-            </a:r>
-            <a:endParaRPr lang="en-US" sz="1200">
-              <a:latin typeface="Times New Roman" panose="02020603050405020304" charset="0"/>
-              <a:cs typeface="Times New Roman" panose="02020603050405020304" charset="0"/>
-            </a:endParaRPr>
-          </a:p>
-          <a:p>
-            <a:endParaRPr lang="en-US" sz="1200"/>
-          </a:p>
-        </p:txBody>
-      </p:sp>
-      <p:sp>
-        <p:nvSpPr>
-          <p:cNvPr id="4" name="Text Box 3"/>
-          <p:cNvSpPr txBox="1"/>
-          <p:nvPr/>
-        </p:nvSpPr>
-        <p:spPr>
-          <a:xfrm>
-            <a:off x="2465705" y="1590675"/>
-            <a:ext cx="2000885" cy="829945"/>
-          </a:xfrm>
-          <a:prstGeom prst="rect">
-            <a:avLst/>
-          </a:prstGeom>
-          <a:noFill/>
-        </p:spPr>
-        <p:txBody>
-          <a:bodyPr wrap="square" rtlCol="0">
-            <a:spAutoFit/>
-          </a:bodyPr>
-          <a:lstStyle/>
-          <a:p>
-            <a:r>
-              <a:rPr lang="en-US" sz="1200">
-                <a:latin typeface="Times New Roman" panose="02020603050405020304" charset="0"/>
-                <a:cs typeface="Times New Roman" panose="02020603050405020304" charset="0"/>
-              </a:rPr>
-              <a:t>Siddharth Gupta</a:t>
-            </a:r>
-          </a:p>
-          <a:p>
-            <a:r>
-              <a:rPr lang="en-US" sz="1200">
-                <a:latin typeface="Times New Roman" panose="02020603050405020304" charset="0"/>
-                <a:cs typeface="Times New Roman" panose="02020603050405020304" charset="0"/>
-              </a:rPr>
-              <a:t>With this project, I came to know how to handle the team .</a:t>
-            </a:r>
-          </a:p>
-        </p:txBody>
-      </p:sp>
-    </p:spTree>
-  </p:cSld>
-  <p:clrMapOvr>
-    <a:masterClrMapping/>
-  </p:clrMapOvr>
-</p:sld>
-</file>
-
-<file path=ppt/slides/slide17.xml><?xml version="1.0" encoding="utf-8"?>
-<p:sld xmlns:a="http://schemas.openxmlformats.org/drawingml/2006/main" xmlns:r="http://schemas.openxmlformats.org/officeDocument/2006/relationships" xmlns:p="http://schemas.openxmlformats.org/presentationml/2006/main">
-  <p:cSld>
-    <p:bg>
-      <p:bgPr>
-        <a:blipFill>
-          <a:blip r:embed="rId2" cstate="print"/>
-          <a:stretch>
-            <a:fillRect t="-17000" b="-17000"/>
-          </a:stretch>
-        </a:blipFill>
-        <a:effectLst/>
-      </p:bgPr>
-    </p:bg>
-    <p:spTree>
-      <p:nvGrpSpPr>
-        <p:cNvPr id="1" name=""/>
-        <p:cNvGrpSpPr/>
-        <p:nvPr/>
-      </p:nvGrpSpPr>
-      <p:grpSpPr>
-        <a:xfrm>
-          <a:off x="0" y="0"/>
-          <a:ext cx="0" cy="0"/>
-          <a:chOff x="0" y="0"/>
-          <a:chExt cx="0" cy="0"/>
-        </a:xfrm>
-      </p:grpSpPr>
-      <p:sp>
-        <p:nvSpPr>
-          <p:cNvPr id="2" name="Title 1"/>
-          <p:cNvSpPr>
-            <a:spLocks noGrp="1"/>
-          </p:cNvSpPr>
-          <p:nvPr>
-            <p:ph type="title"/>
-          </p:nvPr>
-        </p:nvSpPr>
-        <p:spPr>
-          <a:xfrm>
-            <a:off x="838200" y="784778"/>
-            <a:ext cx="10515600" cy="715530"/>
-          </a:xfrm>
-        </p:spPr>
-        <p:txBody>
-          <a:bodyPr>
-            <a:normAutofit/>
-          </a:bodyPr>
-          <a:lstStyle/>
-          <a:p>
-            <a:r>
-              <a:rPr lang="en-US"/>
-              <a:t>Conclusion:</a:t>
-            </a:r>
-          </a:p>
-        </p:txBody>
-      </p:sp>
-      <p:sp>
-        <p:nvSpPr>
-          <p:cNvPr id="3" name="Content Placeholder 2"/>
-          <p:cNvSpPr>
-            <a:spLocks noGrp="1"/>
-          </p:cNvSpPr>
-          <p:nvPr>
-            <p:ph idx="1"/>
-          </p:nvPr>
-        </p:nvSpPr>
-        <p:spPr/>
-        <p:txBody>
-          <a:bodyPr vert="horz" lIns="0" tIns="45720" rIns="0" bIns="45720" rtlCol="0" anchor="t">
-            <a:normAutofit/>
-          </a:bodyPr>
-          <a:lstStyle/>
-          <a:p>
-            <a:pPr>
-              <a:buFont typeface="Arial" panose="020B0604020202020204" pitchFamily="34" charset="0"/>
-              <a:buChar char="•"/>
-            </a:pPr>
-            <a:endParaRPr lang="en-US">
-              <a:cs typeface="Calibri" panose="020F0502020204030204"/>
-            </a:endParaRPr>
-          </a:p>
-          <a:p>
-            <a:endParaRPr lang="en-US"/>
-          </a:p>
-        </p:txBody>
-      </p:sp>
-      <p:sp>
-        <p:nvSpPr>
-          <p:cNvPr id="5" name="TextBox 4"/>
-          <p:cNvSpPr txBox="1"/>
-          <p:nvPr/>
-        </p:nvSpPr>
-        <p:spPr>
-          <a:xfrm>
-            <a:off x="1097280" y="1778000"/>
-            <a:ext cx="9926320" cy="1323439"/>
-          </a:xfrm>
-          <a:prstGeom prst="rect">
-            <a:avLst/>
-          </a:prstGeom>
-          <a:noFill/>
-        </p:spPr>
-        <p:txBody>
-          <a:bodyPr rot="0" spcFirstLastPara="0" vertOverflow="overflow" horzOverflow="overflow" vert="horz" wrap="square" lIns="91440" tIns="45720" rIns="91440" bIns="45720" numCol="1" spcCol="0" rtlCol="0" fromWordArt="0" anchor="t" anchorCtr="0" forceAA="0" compatLnSpc="1">
-            <a:spAutoFit/>
-          </a:bodyPr>
-          <a:lstStyle/>
-          <a:p>
-            <a:pPr marL="342900" indent="-342900">
-              <a:buFont typeface="Arial" panose="020B0604020202020204"/>
-              <a:buChar char="•"/>
-            </a:pPr>
-            <a:r>
-              <a:rPr lang="en-US" sz="2000"/>
-              <a:t>VoizFonica is a company that is aware of the new challenges posed by today’s society. This is why the company offer the means to facilitate communication between people, providing them with the most secure and state of the art technology in order for them to live better, and for them to achieve whatever they resolve.</a:t>
-            </a:r>
-            <a:endParaRPr lang="en-US"/>
-          </a:p>
-        </p:txBody>
-      </p:sp>
-    </p:spTree>
-  </p:cSld>
-  <p:clrMapOvr>
-    <a:masterClrMapping/>
-  </p:clrMapOvr>
-</p:sld>
-</file>
-
-<file path=ppt/slides/slide18.xml><?xml version="1.0" encoding="utf-8"?>
 <p:sld xmlns:a="http://schemas.openxmlformats.org/drawingml/2006/main" xmlns:r="http://schemas.openxmlformats.org/officeDocument/2006/relationships" xmlns:p="http://schemas.openxmlformats.org/presentationml/2006/main">
   <p:cSld>
     <p:bg>
@@ -7448,7 +6242,7 @@
     <p:bg>
       <p:bgPr>
         <a:blipFill>
-          <a:blip r:embed="rId2" cstate="print"/>
+          <a:blip r:embed="rId3" cstate="print"/>
           <a:stretch>
             <a:fillRect t="-17000" b="-17000"/>
           </a:stretch>

</xml_diff>